<commit_message>
avenços en el power point fina a la part tèncica
</commit_message>
<xml_diff>
--- a/El banc del coneixement.pptx
+++ b/El banc del coneixement.pptx
@@ -7,6 +7,8 @@
   <p:sldIdLst>
     <p:sldId id="256" r:id="rId2"/>
     <p:sldId id="257" r:id="rId3"/>
+    <p:sldId id="259" r:id="rId4"/>
+    <p:sldId id="261" r:id="rId5"/>
   </p:sldIdLst>
   <p:sldSz cx="12192000" cy="6858000"/>
   <p:notesSz cx="6858000" cy="9144000"/>
@@ -105,6 +107,11 @@
       </a:defRPr>
     </a:lvl9pPr>
   </p:defaultTextStyle>
+  <p:extLst>
+    <p:ext uri="{EFAFB233-063F-42B5-8137-9DF3F51BA10A}">
+      <p15:sldGuideLst xmlns:p15="http://schemas.microsoft.com/office/powerpoint/2012/main"/>
+    </p:ext>
+  </p:extLst>
 </p:presentation>
 </file>
 
@@ -5935,33 +5942,414 @@
           <a:bodyPr/>
           <a:lstStyle/>
           <a:p>
+            <a:r>
+              <a:rPr lang="es-ES" dirty="0" err="1" smtClean="0"/>
+              <a:t>Què</a:t>
+            </a:r>
+            <a:r>
+              <a:rPr lang="es-ES" dirty="0" smtClean="0"/>
+              <a:t> </a:t>
+            </a:r>
+            <a:r>
+              <a:rPr lang="es-ES" dirty="0" err="1" smtClean="0"/>
+              <a:t>volem</a:t>
+            </a:r>
+            <a:r>
+              <a:rPr lang="es-ES" dirty="0" smtClean="0"/>
+              <a:t> </a:t>
+            </a:r>
+            <a:r>
+              <a:rPr lang="es-ES" dirty="0" err="1" smtClean="0"/>
+              <a:t>fer</a:t>
+            </a:r>
+            <a:r>
+              <a:rPr lang="es-ES" dirty="0"/>
+              <a:t>.</a:t>
+            </a:r>
             <a:endParaRPr lang="es-ES" dirty="0"/>
           </a:p>
         </p:txBody>
       </p:sp>
-      <p:sp>
-        <p:nvSpPr>
-          <p:cNvPr id="3" name="Marcador de contenido 2"/>
-          <p:cNvSpPr>
-            <a:spLocks noGrp="1"/>
-          </p:cNvSpPr>
+      <p:pic>
+        <p:nvPicPr>
+          <p:cNvPr id="6" name="Marcador de contenido 5"/>
+          <p:cNvPicPr>
+            <a:picLocks noGrp="1" noChangeAspect="1"/>
+          </p:cNvPicPr>
           <p:nvPr>
             <p:ph idx="1"/>
           </p:nvPr>
-        </p:nvSpPr>
-        <p:spPr/>
-        <p:txBody>
-          <a:bodyPr/>
-          <a:lstStyle/>
-          <a:p>
-            <a:endParaRPr lang="es-ES"/>
-          </a:p>
-        </p:txBody>
-      </p:sp>
+        </p:nvPicPr>
+        <p:blipFill>
+          <a:blip r:embed="rId2">
+            <a:extLst>
+              <a:ext uri="{28A0092B-C50C-407E-A947-70E740481C1C}">
+                <a14:useLocalDpi xmlns:a14="http://schemas.microsoft.com/office/drawing/2010/main" val="0"/>
+              </a:ext>
+            </a:extLst>
+          </a:blip>
+          <a:stretch>
+            <a:fillRect/>
+          </a:stretch>
+        </p:blipFill>
+        <p:spPr>
+          <a:xfrm>
+            <a:off x="7249297" y="1337733"/>
+            <a:ext cx="4942703" cy="3822358"/>
+          </a:xfrm>
+        </p:spPr>
+      </p:pic>
+      <p:pic>
+        <p:nvPicPr>
+          <p:cNvPr id="8" name="Imagen 7"/>
+          <p:cNvPicPr>
+            <a:picLocks noChangeAspect="1"/>
+          </p:cNvPicPr>
+          <p:nvPr/>
+        </p:nvPicPr>
+        <p:blipFill>
+          <a:blip r:embed="rId3"/>
+          <a:stretch>
+            <a:fillRect/>
+          </a:stretch>
+        </p:blipFill>
+        <p:spPr>
+          <a:xfrm>
+            <a:off x="282147" y="1719734"/>
+            <a:ext cx="6761204" cy="4906360"/>
+          </a:xfrm>
+          <a:prstGeom prst="rect">
+            <a:avLst/>
+          </a:prstGeom>
+        </p:spPr>
+      </p:pic>
+      <p:pic>
+        <p:nvPicPr>
+          <p:cNvPr id="9" name="Imagen 8"/>
+          <p:cNvPicPr>
+            <a:picLocks noChangeAspect="1"/>
+          </p:cNvPicPr>
+          <p:nvPr/>
+        </p:nvPicPr>
+        <p:blipFill rotWithShape="1">
+          <a:blip r:embed="rId4"/>
+          <a:srcRect l="69948" t="36490" r="10485" b="44813"/>
+          <a:stretch/>
+        </p:blipFill>
+        <p:spPr>
+          <a:xfrm>
+            <a:off x="7109255" y="5588126"/>
+            <a:ext cx="1565190" cy="1037968"/>
+          </a:xfrm>
+          <a:prstGeom prst="rect">
+            <a:avLst/>
+          </a:prstGeom>
+        </p:spPr>
+      </p:pic>
     </p:spTree>
     <p:extLst>
       <p:ext uri="{BB962C8B-B14F-4D97-AF65-F5344CB8AC3E}">
         <p14:creationId xmlns:p14="http://schemas.microsoft.com/office/powerpoint/2010/main" val="1245268178"/>
+      </p:ext>
+    </p:extLst>
+  </p:cSld>
+  <p:clrMapOvr>
+    <a:masterClrMapping/>
+  </p:clrMapOvr>
+</p:sld>
+</file>
+
+<file path=ppt/slides/slide3.xml><?xml version="1.0" encoding="utf-8"?>
+<p:sld xmlns:a="http://schemas.openxmlformats.org/drawingml/2006/main" xmlns:r="http://schemas.openxmlformats.org/officeDocument/2006/relationships" xmlns:p="http://schemas.openxmlformats.org/presentationml/2006/main">
+  <p:cSld>
+    <p:spTree>
+      <p:nvGrpSpPr>
+        <p:cNvPr id="1" name=""/>
+        <p:cNvGrpSpPr/>
+        <p:nvPr/>
+      </p:nvGrpSpPr>
+      <p:grpSpPr>
+        <a:xfrm>
+          <a:off x="0" y="0"/>
+          <a:ext cx="0" cy="0"/>
+          <a:chOff x="0" y="0"/>
+          <a:chExt cx="0" cy="0"/>
+        </a:xfrm>
+      </p:grpSpPr>
+      <p:sp>
+        <p:nvSpPr>
+          <p:cNvPr id="2" name="Título 1"/>
+          <p:cNvSpPr>
+            <a:spLocks noGrp="1"/>
+          </p:cNvSpPr>
+          <p:nvPr>
+            <p:ph type="title"/>
+          </p:nvPr>
+        </p:nvSpPr>
+        <p:spPr>
+          <a:xfrm>
+            <a:off x="1260946" y="611599"/>
+            <a:ext cx="10131425" cy="1456267"/>
+          </a:xfrm>
+        </p:spPr>
+        <p:txBody>
+          <a:bodyPr/>
+          <a:lstStyle/>
+          <a:p>
+            <a:r>
+              <a:rPr lang="es-ES" dirty="0" smtClean="0"/>
+              <a:t>QUE PROPOSEM.</a:t>
+            </a:r>
+            <a:endParaRPr lang="es-ES" dirty="0"/>
+          </a:p>
+        </p:txBody>
+      </p:sp>
+      <p:pic>
+        <p:nvPicPr>
+          <p:cNvPr id="4" name="Marcador de contenido 5"/>
+          <p:cNvPicPr>
+            <a:picLocks noGrp="1" noChangeAspect="1"/>
+          </p:cNvPicPr>
+          <p:nvPr>
+            <p:ph idx="1"/>
+          </p:nvPr>
+        </p:nvPicPr>
+        <p:blipFill>
+          <a:blip r:embed="rId2">
+            <a:extLst>
+              <a:ext uri="{28A0092B-C50C-407E-A947-70E740481C1C}">
+                <a14:useLocalDpi xmlns:a14="http://schemas.microsoft.com/office/drawing/2010/main" val="0"/>
+              </a:ext>
+            </a:extLst>
+          </a:blip>
+          <a:stretch>
+            <a:fillRect/>
+          </a:stretch>
+        </p:blipFill>
+        <p:spPr>
+          <a:xfrm>
+            <a:off x="263610" y="2392766"/>
+            <a:ext cx="5642920" cy="4363858"/>
+          </a:xfrm>
+        </p:spPr>
+      </p:pic>
+      <p:sp>
+        <p:nvSpPr>
+          <p:cNvPr id="5" name="CuadroTexto 4"/>
+          <p:cNvSpPr txBox="1"/>
+          <p:nvPr/>
+        </p:nvSpPr>
+        <p:spPr>
+          <a:xfrm>
+            <a:off x="1435385" y="1699534"/>
+            <a:ext cx="5733535" cy="369332"/>
+          </a:xfrm>
+          <a:prstGeom prst="rect">
+            <a:avLst/>
+          </a:prstGeom>
+          <a:noFill/>
+        </p:spPr>
+        <p:txBody>
+          <a:bodyPr wrap="square" rtlCol="0">
+            <a:spAutoFit/>
+          </a:bodyPr>
+          <a:lstStyle/>
+          <a:p>
+            <a:r>
+              <a:rPr lang="es-ES" dirty="0" smtClean="0"/>
+              <a:t>EL CONEIXEMENT D’UN, ÉS BENEFICI DE TOTS</a:t>
+            </a:r>
+            <a:endParaRPr lang="es-ES" dirty="0"/>
+          </a:p>
+        </p:txBody>
+      </p:sp>
+      <p:pic>
+        <p:nvPicPr>
+          <p:cNvPr id="1026" name="Picture 2" descr="Resultado de imagen de conocimiento"/>
+          <p:cNvPicPr>
+            <a:picLocks noChangeAspect="1" noChangeArrowheads="1"/>
+          </p:cNvPicPr>
+          <p:nvPr/>
+        </p:nvPicPr>
+        <p:blipFill>
+          <a:blip r:embed="rId3" cstate="print">
+            <a:extLst>
+              <a:ext uri="{28A0092B-C50C-407E-A947-70E740481C1C}">
+                <a14:useLocalDpi xmlns:a14="http://schemas.microsoft.com/office/drawing/2010/main" val="0"/>
+              </a:ext>
+            </a:extLst>
+          </a:blip>
+          <a:srcRect/>
+          <a:stretch>
+            <a:fillRect/>
+          </a:stretch>
+        </p:blipFill>
+        <p:spPr bwMode="auto">
+          <a:xfrm>
+            <a:off x="7012401" y="4055770"/>
+            <a:ext cx="3876019" cy="2071732"/>
+          </a:xfrm>
+          <a:prstGeom prst="rect">
+            <a:avLst/>
+          </a:prstGeom>
+          <a:noFill/>
+          <a:extLst>
+            <a:ext uri="{909E8E84-426E-40DD-AFC4-6F175D3DCCD1}">
+              <a14:hiddenFill xmlns:a14="http://schemas.microsoft.com/office/drawing/2010/main">
+                <a:solidFill>
+                  <a:srgbClr val="FFFFFF"/>
+                </a:solidFill>
+              </a14:hiddenFill>
+            </a:ext>
+          </a:extLst>
+        </p:spPr>
+      </p:pic>
+      <p:pic>
+        <p:nvPicPr>
+          <p:cNvPr id="7" name="Imagen 6"/>
+          <p:cNvPicPr>
+            <a:picLocks noChangeAspect="1"/>
+          </p:cNvPicPr>
+          <p:nvPr/>
+        </p:nvPicPr>
+        <p:blipFill>
+          <a:blip r:embed="rId4">
+            <a:extLst>
+              <a:ext uri="{28A0092B-C50C-407E-A947-70E740481C1C}">
+                <a14:useLocalDpi xmlns:a14="http://schemas.microsoft.com/office/drawing/2010/main" val="0"/>
+              </a:ext>
+            </a:extLst>
+          </a:blip>
+          <a:stretch>
+            <a:fillRect/>
+          </a:stretch>
+        </p:blipFill>
+        <p:spPr>
+          <a:xfrm>
+            <a:off x="8162863" y="-84898"/>
+            <a:ext cx="3701126" cy="3562865"/>
+          </a:xfrm>
+          <a:prstGeom prst="rect">
+            <a:avLst/>
+          </a:prstGeom>
+        </p:spPr>
+      </p:pic>
+    </p:spTree>
+    <p:extLst>
+      <p:ext uri="{BB962C8B-B14F-4D97-AF65-F5344CB8AC3E}">
+        <p14:creationId xmlns:p14="http://schemas.microsoft.com/office/powerpoint/2010/main" val="1051989408"/>
+      </p:ext>
+    </p:extLst>
+  </p:cSld>
+  <p:clrMapOvr>
+    <a:masterClrMapping/>
+  </p:clrMapOvr>
+</p:sld>
+</file>
+
+<file path=ppt/slides/slide4.xml><?xml version="1.0" encoding="utf-8"?>
+<p:sld xmlns:a="http://schemas.openxmlformats.org/drawingml/2006/main" xmlns:r="http://schemas.openxmlformats.org/officeDocument/2006/relationships" xmlns:p="http://schemas.openxmlformats.org/presentationml/2006/main">
+  <p:cSld>
+    <p:spTree>
+      <p:nvGrpSpPr>
+        <p:cNvPr id="1" name=""/>
+        <p:cNvGrpSpPr/>
+        <p:nvPr/>
+      </p:nvGrpSpPr>
+      <p:grpSpPr>
+        <a:xfrm>
+          <a:off x="0" y="0"/>
+          <a:ext cx="0" cy="0"/>
+          <a:chOff x="0" y="0"/>
+          <a:chExt cx="0" cy="0"/>
+        </a:xfrm>
+      </p:grpSpPr>
+      <p:sp>
+        <p:nvSpPr>
+          <p:cNvPr id="2" name="Título 1"/>
+          <p:cNvSpPr>
+            <a:spLocks noGrp="1"/>
+          </p:cNvSpPr>
+          <p:nvPr>
+            <p:ph type="title"/>
+          </p:nvPr>
+        </p:nvSpPr>
+        <p:spPr/>
+        <p:txBody>
+          <a:bodyPr/>
+          <a:lstStyle/>
+          <a:p>
+            <a:r>
+              <a:rPr lang="es-ES" dirty="0" err="1" smtClean="0"/>
+              <a:t>Cóm</a:t>
+            </a:r>
+            <a:r>
+              <a:rPr lang="es-ES" dirty="0" smtClean="0"/>
+              <a:t> </a:t>
+            </a:r>
+            <a:r>
+              <a:rPr lang="es-ES" dirty="0" err="1" smtClean="0"/>
+              <a:t>ho</a:t>
+            </a:r>
+            <a:r>
+              <a:rPr lang="es-ES" dirty="0" smtClean="0"/>
+              <a:t> </a:t>
+            </a:r>
+            <a:r>
+              <a:rPr lang="es-ES" dirty="0" err="1" smtClean="0"/>
+              <a:t>volem</a:t>
+            </a:r>
+            <a:r>
+              <a:rPr lang="es-ES" dirty="0" smtClean="0"/>
+              <a:t> </a:t>
+            </a:r>
+            <a:r>
+              <a:rPr lang="es-ES" dirty="0" err="1" smtClean="0"/>
+              <a:t>fer</a:t>
+            </a:r>
+            <a:r>
+              <a:rPr lang="es-ES" dirty="0" smtClean="0"/>
+              <a:t>?</a:t>
+            </a:r>
+            <a:endParaRPr lang="es-ES" dirty="0"/>
+          </a:p>
+        </p:txBody>
+      </p:sp>
+      <p:sp>
+        <p:nvSpPr>
+          <p:cNvPr id="3" name="Marcador de contenido 2"/>
+          <p:cNvSpPr>
+            <a:spLocks noGrp="1"/>
+          </p:cNvSpPr>
+          <p:nvPr>
+            <p:ph idx="1"/>
+          </p:nvPr>
+        </p:nvSpPr>
+        <p:spPr/>
+        <p:txBody>
+          <a:bodyPr/>
+          <a:lstStyle/>
+          <a:p>
+            <a:r>
+              <a:rPr lang="es-ES" dirty="0" smtClean="0"/>
+              <a:t>(</a:t>
+            </a:r>
+            <a:r>
+              <a:rPr lang="es-ES" dirty="0" err="1" smtClean="0"/>
+              <a:t>possar</a:t>
+            </a:r>
+            <a:r>
+              <a:rPr lang="es-ES" smtClean="0"/>
+              <a:t> fotos)</a:t>
+            </a:r>
+            <a:endParaRPr lang="es-ES" dirty="0"/>
+          </a:p>
+        </p:txBody>
+      </p:sp>
+    </p:spTree>
+    <p:extLst>
+      <p:ext uri="{BB962C8B-B14F-4D97-AF65-F5344CB8AC3E}">
+        <p14:creationId xmlns:p14="http://schemas.microsoft.com/office/powerpoint/2010/main" val="3930028505"/>
       </p:ext>
     </p:extLst>
   </p:cSld>

</xml_diff>

<commit_message>
a la espera de fotos dels recursos tècnics inacabats
</commit_message>
<xml_diff>
--- a/El banc del coneixement.pptx
+++ b/El banc del coneixement.pptx
@@ -9,6 +9,7 @@
     <p:sldId id="257" r:id="rId3"/>
     <p:sldId id="259" r:id="rId4"/>
     <p:sldId id="261" r:id="rId5"/>
+    <p:sldId id="262" r:id="rId6"/>
   </p:sldIdLst>
   <p:sldSz cx="12192000" cy="6858000"/>
   <p:notesSz cx="6858000" cy="9144000"/>
@@ -6088,8 +6089,8 @@
         </p:nvSpPr>
         <p:spPr>
           <a:xfrm>
-            <a:off x="1260946" y="611599"/>
-            <a:ext cx="10131425" cy="1456267"/>
+            <a:off x="717248" y="612599"/>
+            <a:ext cx="5304611" cy="1456267"/>
           </a:xfrm>
         </p:spPr>
         <p:txBody>
@@ -6097,8 +6098,12 @@
           <a:lstStyle/>
           <a:p>
             <a:r>
+              <a:rPr lang="es-ES" dirty="0" err="1" smtClean="0"/>
+              <a:t>QUè</a:t>
+            </a:r>
+            <a:r>
               <a:rPr lang="es-ES" dirty="0" smtClean="0"/>
-              <a:t>QUE PROPOSEM.</a:t>
+              <a:t> PROPOSEM.</a:t>
             </a:r>
             <a:endParaRPr lang="es-ES" dirty="0"/>
           </a:p>
@@ -6141,7 +6146,7 @@
         </p:nvSpPr>
         <p:spPr>
           <a:xfrm>
-            <a:off x="1435385" y="1699534"/>
+            <a:off x="817548" y="1676818"/>
             <a:ext cx="5733535" cy="369332"/>
           </a:xfrm>
           <a:prstGeom prst="rect">
@@ -6281,7 +6286,7 @@
           <a:p>
             <a:r>
               <a:rPr lang="es-ES" dirty="0" err="1" smtClean="0"/>
-              <a:t>Cóm</a:t>
+              <a:t>Com</a:t>
             </a:r>
             <a:r>
               <a:rPr lang="es-ES" dirty="0" smtClean="0"/>
@@ -6339,8 +6344,8 @@
               <a:t>possar</a:t>
             </a:r>
             <a:r>
-              <a:rPr lang="es-ES" smtClean="0"/>
-              <a:t> fotos)</a:t>
+              <a:rPr lang="es-ES" dirty="0" smtClean="0"/>
+              <a:t> fotos de la página web i la app)</a:t>
             </a:r>
             <a:endParaRPr lang="es-ES" dirty="0"/>
           </a:p>
@@ -6350,6 +6355,188 @@
     <p:extLst>
       <p:ext uri="{BB962C8B-B14F-4D97-AF65-F5344CB8AC3E}">
         <p14:creationId xmlns:p14="http://schemas.microsoft.com/office/powerpoint/2010/main" val="3930028505"/>
+      </p:ext>
+    </p:extLst>
+  </p:cSld>
+  <p:clrMapOvr>
+    <a:masterClrMapping/>
+  </p:clrMapOvr>
+</p:sld>
+</file>
+
+<file path=ppt/slides/slide5.xml><?xml version="1.0" encoding="utf-8"?>
+<p:sld xmlns:a="http://schemas.openxmlformats.org/drawingml/2006/main" xmlns:r="http://schemas.openxmlformats.org/officeDocument/2006/relationships" xmlns:p="http://schemas.openxmlformats.org/presentationml/2006/main">
+  <p:cSld>
+    <p:spTree>
+      <p:nvGrpSpPr>
+        <p:cNvPr id="1" name=""/>
+        <p:cNvGrpSpPr/>
+        <p:nvPr/>
+      </p:nvGrpSpPr>
+      <p:grpSpPr>
+        <a:xfrm>
+          <a:off x="0" y="0"/>
+          <a:ext cx="0" cy="0"/>
+          <a:chOff x="0" y="0"/>
+          <a:chExt cx="0" cy="0"/>
+        </a:xfrm>
+      </p:grpSpPr>
+      <p:sp>
+        <p:nvSpPr>
+          <p:cNvPr id="2" name="Título 1"/>
+          <p:cNvSpPr>
+            <a:spLocks noGrp="1"/>
+          </p:cNvSpPr>
+          <p:nvPr>
+            <p:ph type="title"/>
+          </p:nvPr>
+        </p:nvSpPr>
+        <p:spPr/>
+        <p:txBody>
+          <a:bodyPr/>
+          <a:lstStyle/>
+          <a:p>
+            <a:r>
+              <a:rPr lang="es-ES" dirty="0" err="1" smtClean="0"/>
+              <a:t>Com</a:t>
+            </a:r>
+            <a:r>
+              <a:rPr lang="es-ES" dirty="0" smtClean="0"/>
+              <a:t> es financia</a:t>
+            </a:r>
+            <a:endParaRPr lang="es-ES" dirty="0"/>
+          </a:p>
+        </p:txBody>
+      </p:sp>
+      <p:pic>
+        <p:nvPicPr>
+          <p:cNvPr id="2052" name="Picture 4" descr="Imagen relacionada"/>
+          <p:cNvPicPr>
+            <a:picLocks noGrp="1" noChangeAspect="1" noChangeArrowheads="1"/>
+          </p:cNvPicPr>
+          <p:nvPr>
+            <p:ph idx="1"/>
+          </p:nvPr>
+        </p:nvPicPr>
+        <p:blipFill>
+          <a:blip r:embed="rId2">
+            <a:extLst>
+              <a:ext uri="{28A0092B-C50C-407E-A947-70E740481C1C}">
+                <a14:useLocalDpi xmlns:a14="http://schemas.microsoft.com/office/drawing/2010/main" val="0"/>
+              </a:ext>
+            </a:extLst>
+          </a:blip>
+          <a:srcRect/>
+          <a:stretch>
+            <a:fillRect/>
+          </a:stretch>
+        </p:blipFill>
+        <p:spPr bwMode="auto">
+          <a:xfrm>
+            <a:off x="1036659" y="1876791"/>
+            <a:ext cx="7644147" cy="2463114"/>
+          </a:xfrm>
+          <a:prstGeom prst="rect">
+            <a:avLst/>
+          </a:prstGeom>
+          <a:noFill/>
+          <a:extLst>
+            <a:ext uri="{909E8E84-426E-40DD-AFC4-6F175D3DCCD1}">
+              <a14:hiddenFill xmlns:a14="http://schemas.microsoft.com/office/drawing/2010/main">
+                <a:solidFill>
+                  <a:srgbClr val="FFFFFF"/>
+                </a:solidFill>
+              </a14:hiddenFill>
+            </a:ext>
+          </a:extLst>
+        </p:spPr>
+      </p:pic>
+      <p:pic>
+        <p:nvPicPr>
+          <p:cNvPr id="2054" name="Picture 6" descr="Resultado de imagen de premios.png"/>
+          <p:cNvPicPr>
+            <a:picLocks noChangeAspect="1" noChangeArrowheads="1"/>
+          </p:cNvPicPr>
+          <p:nvPr/>
+        </p:nvPicPr>
+        <p:blipFill>
+          <a:blip r:embed="rId3">
+            <a:extLst>
+              <a:ext uri="{28A0092B-C50C-407E-A947-70E740481C1C}">
+                <a14:useLocalDpi xmlns:a14="http://schemas.microsoft.com/office/drawing/2010/main" val="0"/>
+              </a:ext>
+            </a:extLst>
+          </a:blip>
+          <a:srcRect/>
+          <a:stretch>
+            <a:fillRect/>
+          </a:stretch>
+        </p:blipFill>
+        <p:spPr bwMode="auto">
+          <a:xfrm>
+            <a:off x="2685043" y="4339905"/>
+            <a:ext cx="2266842" cy="2266842"/>
+          </a:xfrm>
+          <a:prstGeom prst="rect">
+            <a:avLst/>
+          </a:prstGeom>
+          <a:noFill/>
+          <a:extLst>
+            <a:ext uri="{909E8E84-426E-40DD-AFC4-6F175D3DCCD1}">
+              <a14:hiddenFill xmlns:a14="http://schemas.microsoft.com/office/drawing/2010/main">
+                <a:solidFill>
+                  <a:srgbClr val="FFFFFF"/>
+                </a:solidFill>
+              </a14:hiddenFill>
+            </a:ext>
+          </a:extLst>
+        </p:spPr>
+      </p:pic>
+      <p:pic>
+        <p:nvPicPr>
+          <p:cNvPr id="2056" name="Picture 8" descr="Resultado de imagen de publicidad.png"/>
+          <p:cNvPicPr>
+            <a:picLocks noChangeAspect="1" noChangeArrowheads="1"/>
+          </p:cNvPicPr>
+          <p:nvPr/>
+        </p:nvPicPr>
+        <p:blipFill>
+          <a:blip r:embed="rId4">
+            <a:extLst>
+              <a:ext uri="{28A0092B-C50C-407E-A947-70E740481C1C}">
+                <a14:useLocalDpi xmlns:a14="http://schemas.microsoft.com/office/drawing/2010/main" val="0"/>
+              </a:ext>
+            </a:extLst>
+          </a:blip>
+          <a:srcRect/>
+          <a:stretch>
+            <a:fillRect/>
+          </a:stretch>
+        </p:blipFill>
+        <p:spPr bwMode="auto">
+          <a:xfrm rot="19851955">
+            <a:off x="7148146" y="3068413"/>
+            <a:ext cx="4811598" cy="2667299"/>
+          </a:xfrm>
+          <a:prstGeom prst="rect">
+            <a:avLst/>
+          </a:prstGeom>
+          <a:noFill/>
+          <a:extLst>
+            <a:ext uri="{909E8E84-426E-40DD-AFC4-6F175D3DCCD1}">
+              <a14:hiddenFill xmlns:a14="http://schemas.microsoft.com/office/drawing/2010/main">
+                <a:solidFill>
+                  <a:srgbClr val="FFFFFF"/>
+                </a:solidFill>
+              </a14:hiddenFill>
+            </a:ext>
+          </a:extLst>
+        </p:spPr>
+      </p:pic>
+    </p:spTree>
+    <p:extLst>
+      <p:ext uri="{BB962C8B-B14F-4D97-AF65-F5344CB8AC3E}">
+        <p14:creationId xmlns:p14="http://schemas.microsoft.com/office/powerpoint/2010/main" val="3803766517"/>
       </p:ext>
     </p:extLst>
   </p:cSld>

</xml_diff>